<commit_message>
add readme^ fix presentation
</commit_message>
<xml_diff>
--- a/docs/Готовое/процессор.pptx
+++ b/docs/Готовое/процессор.pptx
@@ -3870,13 +3870,13 @@
         </p:nvSpPr>
         <p:spPr>
           <a:xfrm>
-            <a:off x="338667" y="583141"/>
-            <a:ext cx="11667066" cy="6147859"/>
+            <a:off x="0" y="547101"/>
+            <a:ext cx="12192001" cy="6310899"/>
           </a:xfrm>
         </p:spPr>
         <p:txBody>
           <a:bodyPr>
-            <a:normAutofit fontScale="92500" lnSpcReduction="10000"/>
+            <a:normAutofit fontScale="92500"/>
           </a:bodyPr>
           <a:lstStyle/>
           <a:p>
@@ -3884,174 +3884,173 @@
               <a:buNone/>
             </a:pPr>
             <a:r>
-              <a:rPr lang="ru-RU" sz="2000" dirty="0"/>
+              <a:rPr lang="ru-RU" sz="2400" dirty="0"/>
               <a:t>Оперативная память – </a:t>
             </a:r>
             <a:r>
-              <a:rPr lang="ru-RU" sz="2000" b="1" dirty="0"/>
+              <a:rPr lang="ru-RU" sz="2400" b="1" dirty="0"/>
               <a:t>16</a:t>
             </a:r>
             <a:r>
-              <a:rPr lang="ru-RU" sz="2000" dirty="0"/>
-              <a:t> восьмиразрядных ячеек</a:t>
+              <a:rPr lang="en-US" sz="2400" b="1" dirty="0"/>
+              <a:t>x8 </a:t>
+            </a:r>
+            <a:r>
+              <a:rPr lang="en-US" sz="2400" dirty="0"/>
+              <a:t>		</a:t>
+            </a:r>
+            <a:r>
+              <a:rPr lang="ru-RU" sz="2400" dirty="0"/>
+              <a:t>	Операнды – </a:t>
+            </a:r>
+            <a:r>
+              <a:rPr lang="ru-RU" sz="2400" b="1" dirty="0"/>
+              <a:t>дробные числа </a:t>
+            </a:r>
+            <a:r>
+              <a:rPr lang="ru-RU" sz="2400" dirty="0"/>
+              <a:t>в дополнительном коде</a:t>
             </a:r>
             <a:br>
-              <a:rPr lang="ru-RU" sz="2000" dirty="0"/>
+              <a:rPr lang="en-US" sz="2400" dirty="0"/>
             </a:br>
             <a:r>
-              <a:rPr lang="ru-RU" sz="2000" dirty="0"/>
+              <a:rPr lang="ru-RU" sz="2400" dirty="0"/>
               <a:t>Регистровая память – </a:t>
             </a:r>
             <a:r>
-              <a:rPr lang="ru-RU" sz="2000" b="1" dirty="0"/>
+              <a:rPr lang="ru-RU" sz="2400" b="1" dirty="0"/>
               <a:t>8</a:t>
             </a:r>
             <a:r>
-              <a:rPr lang="ru-RU" sz="2000" dirty="0"/>
-              <a:t> четырехразрядных ячеек</a:t>
-            </a:r>
-            <a:br>
-              <a:rPr lang="ru-RU" sz="2000" dirty="0"/>
-            </a:br>
-            <a:r>
-              <a:rPr lang="ru-RU" sz="2000" dirty="0"/>
-              <a:t>Слово = </a:t>
-            </a:r>
-            <a:r>
-              <a:rPr lang="ru-RU" sz="2000" b="1" dirty="0"/>
+              <a:rPr lang="en-US" sz="2400" b="1" dirty="0"/>
+              <a:t>x4</a:t>
+            </a:r>
+            <a:r>
+              <a:rPr lang="en-US" sz="2400" dirty="0"/>
+              <a:t> 		</a:t>
+            </a:r>
+            <a:r>
+              <a:rPr lang="ru-RU" sz="2400" dirty="0"/>
+              <a:t>	Слово = </a:t>
+            </a:r>
+            <a:r>
+              <a:rPr lang="ru-RU" sz="2400" b="1" dirty="0"/>
               <a:t>4 разряда</a:t>
             </a:r>
-            <a:br>
-              <a:rPr lang="ru-RU" sz="2000" dirty="0"/>
-            </a:br>
-            <a:r>
-              <a:rPr lang="ru-RU" sz="2000" dirty="0"/>
-              <a:t>Операнды – </a:t>
-            </a:r>
-            <a:r>
-              <a:rPr lang="ru-RU" sz="2000" b="1" dirty="0"/>
-              <a:t>дробные числа </a:t>
-            </a:r>
-            <a:r>
-              <a:rPr lang="ru-RU" sz="2000" dirty="0"/>
-              <a:t>с фиксированной запятой в дополнительном коде</a:t>
-            </a:r>
-          </a:p>
-          <a:p>
-            <a:pPr marL="0" indent="0" algn="ctr">
-              <a:buNone/>
-            </a:pPr>
-            <a:r>
-              <a:rPr lang="ru-RU" sz="2000" dirty="0"/>
-              <a:t>Формат команд:</a:t>
-            </a:r>
+            <a:endParaRPr lang="en-US" sz="2400" b="1" dirty="0"/>
           </a:p>
           <a:p>
             <a:pPr marL="0" indent="0">
               <a:buNone/>
             </a:pPr>
             <a:r>
-              <a:rPr lang="ru-RU" sz="2000" b="1" dirty="0"/>
+              <a:rPr lang="ru-RU" dirty="0"/>
+              <a:t>	Формат команд:</a:t>
+            </a:r>
+            <a:br>
+              <a:rPr lang="en-US" dirty="0"/>
+            </a:br>
+            <a:r>
+              <a:rPr lang="ru-RU" sz="2400" b="1" dirty="0"/>
               <a:t>Первый операнд </a:t>
             </a:r>
             <a:r>
-              <a:rPr lang="ru-RU" sz="2000" dirty="0"/>
+              <a:rPr lang="ru-RU" sz="2400" dirty="0"/>
               <a:t>команды хранится в </a:t>
             </a:r>
             <a:r>
-              <a:rPr lang="ru-RU" sz="2000" b="1" dirty="0"/>
+              <a:rPr lang="ru-RU" sz="2400" b="1" dirty="0"/>
               <a:t>РП</a:t>
             </a:r>
             <a:r>
-              <a:rPr lang="ru-RU" sz="2000" dirty="0"/>
+              <a:rPr lang="ru-RU" sz="2400" dirty="0"/>
               <a:t>. Адресация прямая</a:t>
             </a:r>
             <a:br>
-              <a:rPr lang="ru-RU" sz="2000" dirty="0"/>
+              <a:rPr lang="ru-RU" sz="2400" dirty="0"/>
             </a:br>
             <a:r>
-              <a:rPr lang="ru-RU" sz="2000" b="1" dirty="0"/>
+              <a:rPr lang="ru-RU" sz="2400" b="1" dirty="0"/>
               <a:t>Второй операнд </a:t>
             </a:r>
             <a:r>
-              <a:rPr lang="ru-RU" sz="2000" dirty="0"/>
+              <a:rPr lang="ru-RU" sz="2400" dirty="0"/>
               <a:t>хранится в </a:t>
             </a:r>
             <a:r>
-              <a:rPr lang="ru-RU" sz="2000" b="1" dirty="0"/>
+              <a:rPr lang="ru-RU" sz="2400" b="1" dirty="0"/>
               <a:t>ОП</a:t>
             </a:r>
             <a:r>
-              <a:rPr lang="ru-RU" sz="2000" dirty="0"/>
+              <a:rPr lang="ru-RU" sz="2400" dirty="0"/>
               <a:t> (</a:t>
             </a:r>
             <a:r>
-              <a:rPr lang="en-US" sz="2000" dirty="0"/>
+              <a:rPr lang="en-US" sz="2400" dirty="0"/>
               <a:t>PA2=0 </a:t>
             </a:r>
             <a:r>
-              <a:rPr lang="ru-RU" sz="2000" dirty="0"/>
+              <a:rPr lang="ru-RU" sz="2400" dirty="0"/>
               <a:t>- прямая адресация, </a:t>
             </a:r>
             <a:r>
-              <a:rPr lang="en-US" sz="2000" dirty="0"/>
+              <a:rPr lang="en-US" sz="2400" dirty="0"/>
               <a:t>PA2=1</a:t>
             </a:r>
             <a:r>
-              <a:rPr lang="ru-RU" sz="2000" dirty="0"/>
+              <a:rPr lang="ru-RU" sz="2400" dirty="0"/>
               <a:t> - </a:t>
             </a:r>
             <a:r>
-              <a:rPr lang="ru-RU" sz="2000" dirty="0" err="1"/>
+              <a:rPr lang="ru-RU" sz="2400" dirty="0" err="1"/>
               <a:t>постиндексная</a:t>
             </a:r>
             <a:r>
-              <a:rPr lang="ru-RU" sz="2000" dirty="0"/>
+              <a:rPr lang="ru-RU" sz="2400" dirty="0"/>
               <a:t> косвенная вариант 2)</a:t>
             </a:r>
             <a:br>
-              <a:rPr lang="ru-RU" sz="2000" dirty="0"/>
+              <a:rPr lang="ru-RU" sz="2400" dirty="0"/>
             </a:br>
             <a:r>
-              <a:rPr lang="ru-RU" sz="2000" dirty="0"/>
+              <a:rPr lang="ru-RU" sz="2400" dirty="0"/>
               <a:t>Результат операции </a:t>
             </a:r>
             <a:r>
-              <a:rPr lang="ru-RU" sz="2000" b="1" dirty="0"/>
+              <a:rPr lang="ru-RU" sz="2400" b="1" dirty="0"/>
               <a:t>УМНОЖЕНИЕ</a:t>
             </a:r>
             <a:r>
-              <a:rPr lang="ru-RU" sz="2000" dirty="0"/>
+              <a:rPr lang="ru-RU" sz="2400" dirty="0"/>
               <a:t> записывается по адресу </a:t>
             </a:r>
             <a:r>
-              <a:rPr lang="ru-RU" sz="2000" b="1" dirty="0"/>
+              <a:rPr lang="ru-RU" sz="2400" b="1" dirty="0"/>
               <a:t>второго операнда</a:t>
             </a:r>
             <a:r>
-              <a:rPr lang="ru-RU" sz="2000" dirty="0"/>
-              <a:t>. Результат операции </a:t>
-            </a:r>
-            <a:r>
-              <a:rPr lang="ru-RU" sz="2000" b="1" dirty="0"/>
-              <a:t>ПЕРЕСЫЛКА ОТРИЦАТЕЛЬНАЯ </a:t>
-            </a:r>
-            <a:r>
-              <a:rPr lang="ru-RU" sz="2000" dirty="0"/>
-              <a:t>записывается по адресу </a:t>
-            </a:r>
-            <a:r>
-              <a:rPr lang="ru-RU" sz="2000" b="1" dirty="0"/>
+              <a:rPr lang="ru-RU" sz="2400" dirty="0"/>
+              <a:t>. </a:t>
+            </a:r>
+            <a:br>
+              <a:rPr lang="ru-RU" sz="2400" dirty="0"/>
+            </a:br>
+            <a:r>
+              <a:rPr lang="ru-RU" sz="2400" dirty="0"/>
+              <a:t>Результат </a:t>
+            </a:r>
+            <a:r>
+              <a:rPr lang="ru-RU" sz="2400" b="1" dirty="0"/>
+              <a:t>ПЕРЕСЫЛКИ ОТРИЦАТЕЛЬНОЙ </a:t>
+            </a:r>
+            <a:r>
+              <a:rPr lang="ru-RU" sz="2400" dirty="0"/>
+              <a:t>по адресу </a:t>
+            </a:r>
+            <a:r>
+              <a:rPr lang="ru-RU" sz="2400" b="1" dirty="0"/>
               <a:t>первого операнда</a:t>
-            </a:r>
-          </a:p>
-          <a:p>
-            <a:pPr marL="0" indent="0" algn="ctr">
-              <a:buNone/>
-            </a:pPr>
-            <a:r>
-              <a:rPr lang="ru-RU" sz="2000" dirty="0"/>
-              <a:t>Операции:</a:t>
             </a:r>
           </a:p>
           <a:p>
@@ -4059,72 +4058,101 @@
               <a:buNone/>
             </a:pPr>
             <a:r>
-              <a:rPr lang="ru-RU" sz="2000" b="1" dirty="0"/>
+              <a:rPr lang="ru-RU" dirty="0"/>
+              <a:t>	Операции:</a:t>
+            </a:r>
+            <a:br>
+              <a:rPr lang="ru-RU" sz="2400" dirty="0"/>
+            </a:br>
+            <a:r>
+              <a:rPr lang="ru-RU" sz="2400" b="1" dirty="0"/>
               <a:t>УМНОЖЕНИЕ</a:t>
             </a:r>
             <a:r>
-              <a:rPr lang="ru-RU" sz="2000" dirty="0"/>
-              <a:t> – алгоритм умножения чисел в дополнительном коде с младших разрядов множителя и сдвигом частичных произведений вправо путем последовательного преобразования множителя</a:t>
+              <a:rPr lang="ru-RU" sz="2400" dirty="0"/>
+              <a:t> – алгоритм умножения чисел в дополнительном коде с младших разрядов множителя</a:t>
             </a:r>
             <a:br>
-              <a:rPr lang="ru-RU" sz="2000" dirty="0"/>
+              <a:rPr lang="ru-RU" sz="2400" dirty="0"/>
             </a:br>
             <a:r>
-              <a:rPr lang="ru-RU" sz="2000" b="1" dirty="0"/>
+              <a:rPr lang="ru-RU" sz="2400" b="1" dirty="0"/>
               <a:t>ПЕРЕСЫЛКА ОТРИЦАТЕЛЬНАЯ </a:t>
             </a:r>
             <a:r>
-              <a:rPr lang="ru-RU" sz="2000" dirty="0"/>
-              <a:t>– дополнительный код абсолютного значения второго операнда помещается </a:t>
+              <a:rPr lang="ru-RU" sz="2400" dirty="0"/>
+              <a:t>– дополнительный код абсолютного значения </a:t>
+            </a:r>
+            <a:r>
+              <a:rPr lang="ru-RU" sz="2400" b="1" dirty="0"/>
+              <a:t>второго операнда </a:t>
+            </a:r>
+            <a:r>
+              <a:rPr lang="ru-RU" sz="2400" dirty="0"/>
+              <a:t>пишется по </a:t>
+            </a:r>
+            <a:r>
+              <a:rPr lang="ru-RU" sz="2400" b="1" dirty="0"/>
+              <a:t>адресу первого операнда</a:t>
+            </a:r>
+            <a:r>
+              <a:rPr lang="ru-RU" sz="2400" dirty="0"/>
+              <a:t>. То есть, модуль второго операнда берем со знаком минус </a:t>
             </a:r>
             <a:br>
-              <a:rPr lang="ru-RU" sz="2000" dirty="0"/>
+              <a:rPr lang="ru-RU" sz="2400" dirty="0"/>
             </a:br>
             <a:r>
-              <a:rPr lang="ru-RU" sz="2000" dirty="0"/>
-              <a:t>по адресу первого операнда. Нуль, имеющий положительный знак, остается без изменения. Результат отличается от второго операнда только для положительных чисел; отрицательные числа остаются </a:t>
+              <a:rPr lang="ru-RU" sz="2400" dirty="0"/>
+              <a:t>(исключение 0). Устанавливается признак результата: 0 – (результат = 0), 1 – (результат </a:t>
+            </a:r>
+            <a:r>
+              <a:rPr lang="en-US" sz="2400" dirty="0"/>
+              <a:t>&lt;</a:t>
+            </a:r>
+            <a:r>
+              <a:rPr lang="ru-RU" sz="2400" dirty="0"/>
+              <a:t> 0)</a:t>
             </a:r>
             <a:br>
-              <a:rPr lang="ru-RU" sz="2000" dirty="0"/>
+              <a:rPr lang="ru-RU" sz="2400" dirty="0"/>
             </a:br>
-            <a:r>
-              <a:rPr lang="ru-RU" sz="2000" dirty="0"/>
-              <a:t>без изменения. Устанавливается признак результата: 0 – (результат = 0), 1 – (результат </a:t>
-            </a:r>
-            <a:r>
-              <a:rPr lang="en-US" sz="2000" dirty="0"/>
-              <a:t>&lt;</a:t>
-            </a:r>
-            <a:r>
-              <a:rPr lang="ru-RU" sz="2000" dirty="0"/>
-              <a:t> 0)</a:t>
-            </a:r>
-          </a:p>
-          <a:p>
-            <a:pPr marL="0" indent="0">
-              <a:buNone/>
-            </a:pPr>
             <a:br>
-              <a:rPr lang="ru-RU" sz="2000" dirty="0"/>
+              <a:rPr lang="ru-RU" sz="2400" dirty="0"/>
             </a:br>
             <a:r>
-              <a:rPr lang="ru-RU" sz="2000" b="1" dirty="0"/>
+              <a:rPr lang="ru-RU" sz="2400" b="1" dirty="0"/>
               <a:t>ПЕРЕХОД, ЕСЛИ 1 </a:t>
             </a:r>
             <a:r>
-              <a:rPr lang="ru-RU" sz="2000" dirty="0"/>
-              <a:t>– продвинутый адрес в счетчике команд замещается адресом перехода, если значение признака результата равно 1. Для задания адреса перехода используется относительная адресация (в команде указывается смещение со знаком)</a:t>
+              <a:rPr lang="ru-RU" sz="2400" dirty="0"/>
+              <a:t>– продвинутый адрес в счетчике команд замещается адресом перехода, если значение </a:t>
+            </a:r>
+            <a:r>
+              <a:rPr lang="en-US" sz="2400" dirty="0"/>
+              <a:t>PR = </a:t>
+            </a:r>
+            <a:r>
+              <a:rPr lang="ru-RU" sz="2400" dirty="0"/>
+              <a:t>1. Используется относительная адресация (в команде – смещение со знаком)</a:t>
             </a:r>
             <a:br>
-              <a:rPr lang="ru-RU" sz="2000" dirty="0"/>
+              <a:rPr lang="ru-RU" sz="2400" dirty="0"/>
             </a:br>
             <a:r>
-              <a:rPr lang="ru-RU" sz="2000" b="1" dirty="0"/>
+              <a:rPr lang="ru-RU" sz="2400" b="1" dirty="0"/>
               <a:t>БЕЗУСЛОВНЫЙ ПЕРЕХОД </a:t>
             </a:r>
             <a:r>
-              <a:rPr lang="ru-RU" sz="2000" dirty="0"/>
-              <a:t>– продвинутый адрес в счетчике команд замещается адресом перехода. Для задания адреса перехода используется относительная адресация (в команде указывается смещение со знаком)</a:t>
+              <a:rPr lang="ru-RU" sz="2400" dirty="0"/>
+              <a:t>– продвинутый адрес в счетчике команд замещается адресом перехода. </a:t>
+            </a:r>
+            <a:br>
+              <a:rPr lang="en-US" sz="2400" dirty="0"/>
+            </a:br>
+            <a:r>
+              <a:rPr lang="ru-RU" sz="2400" dirty="0"/>
+              <a:t>Используется относительная адресация (в команде указывается смещение со знаком)</a:t>
             </a:r>
           </a:p>
         </p:txBody>
@@ -4209,8 +4237,8 @@
         </p:blipFill>
         <p:spPr>
           <a:xfrm>
-            <a:off x="841324" y="2009490"/>
-            <a:ext cx="5108789" cy="3208349"/>
+            <a:off x="227387" y="1493433"/>
+            <a:ext cx="5725852" cy="3595868"/>
           </a:xfrm>
           <a:prstGeom prst="rect">
             <a:avLst/>
@@ -4239,8 +4267,8 @@
         </p:blipFill>
         <p:spPr>
           <a:xfrm>
-            <a:off x="6238762" y="1493433"/>
-            <a:ext cx="5303173" cy="3871131"/>
+            <a:off x="6207877" y="1193623"/>
+            <a:ext cx="5756736" cy="4202216"/>
           </a:xfrm>
           <a:prstGeom prst="rect">
             <a:avLst/>
@@ -4497,6 +4525,36 @@
           <a:chExt cx="0" cy="0"/>
         </a:xfrm>
       </p:grpSpPr>
+      <p:pic>
+        <p:nvPicPr>
+          <p:cNvPr id="17" name="Рисунок 16">
+            <a:extLst>
+              <a:ext uri="{FF2B5EF4-FFF2-40B4-BE49-F238E27FC236}">
+                <a16:creationId xmlns:a16="http://schemas.microsoft.com/office/drawing/2014/main" id="{63278449-55C2-E849-92B4-BC49858ECCB5}"/>
+              </a:ext>
+            </a:extLst>
+          </p:cNvPr>
+          <p:cNvPicPr>
+            <a:picLocks noChangeAspect="1"/>
+          </p:cNvPicPr>
+          <p:nvPr/>
+        </p:nvPicPr>
+        <p:blipFill>
+          <a:blip r:embed="rId2"/>
+          <a:stretch>
+            <a:fillRect/>
+          </a:stretch>
+        </p:blipFill>
+        <p:spPr>
+          <a:xfrm>
+            <a:off x="704636" y="2229073"/>
+            <a:ext cx="4781764" cy="3267305"/>
+          </a:xfrm>
+          <a:prstGeom prst="rect">
+            <a:avLst/>
+          </a:prstGeom>
+        </p:spPr>
+      </p:pic>
       <p:sp>
         <p:nvSpPr>
           <p:cNvPr id="2" name="Заголовок 1">
@@ -4650,7 +4708,7 @@
           <p:nvPr/>
         </p:nvPicPr>
         <p:blipFill>
-          <a:blip r:embed="rId2"/>
+          <a:blip r:embed="rId3"/>
           <a:stretch>
             <a:fillRect/>
           </a:stretch>
@@ -4680,7 +4738,7 @@
           <p:nvPr/>
         </p:nvPicPr>
         <p:blipFill>
-          <a:blip r:embed="rId3"/>
+          <a:blip r:embed="rId4"/>
           <a:stretch>
             <a:fillRect/>
           </a:stretch>
@@ -4710,7 +4768,7 @@
           <p:nvPr/>
         </p:nvPicPr>
         <p:blipFill>
-          <a:blip r:embed="rId4"/>
+          <a:blip r:embed="rId5"/>
           <a:stretch>
             <a:fillRect/>
           </a:stretch>
@@ -4795,36 +4853,6 @@
           </a:p>
         </p:txBody>
       </p:sp>
-      <p:pic>
-        <p:nvPicPr>
-          <p:cNvPr id="17" name="Рисунок 16">
-            <a:extLst>
-              <a:ext uri="{FF2B5EF4-FFF2-40B4-BE49-F238E27FC236}">
-                <a16:creationId xmlns:a16="http://schemas.microsoft.com/office/drawing/2014/main" id="{63278449-55C2-E849-92B4-BC49858ECCB5}"/>
-              </a:ext>
-            </a:extLst>
-          </p:cNvPr>
-          <p:cNvPicPr>
-            <a:picLocks noChangeAspect="1"/>
-          </p:cNvPicPr>
-          <p:nvPr/>
-        </p:nvPicPr>
-        <p:blipFill>
-          <a:blip r:embed="rId5"/>
-          <a:stretch>
-            <a:fillRect/>
-          </a:stretch>
-        </p:blipFill>
-        <p:spPr>
-          <a:xfrm>
-            <a:off x="704636" y="2537278"/>
-            <a:ext cx="4330700" cy="2959100"/>
-          </a:xfrm>
-          <a:prstGeom prst="rect">
-            <a:avLst/>
-          </a:prstGeom>
-        </p:spPr>
-      </p:pic>
       <p:sp>
         <p:nvSpPr>
           <p:cNvPr id="18" name="TextBox 17">
@@ -4890,36 +4918,6 @@
           <a:chExt cx="0" cy="0"/>
         </a:xfrm>
       </p:grpSpPr>
-      <p:pic>
-        <p:nvPicPr>
-          <p:cNvPr id="5" name="Рисунок 4">
-            <a:extLst>
-              <a:ext uri="{FF2B5EF4-FFF2-40B4-BE49-F238E27FC236}">
-                <a16:creationId xmlns:a16="http://schemas.microsoft.com/office/drawing/2014/main" id="{14C883C3-F3E5-DB45-88C8-5E32C5954A74}"/>
-              </a:ext>
-            </a:extLst>
-          </p:cNvPr>
-          <p:cNvPicPr>
-            <a:picLocks noChangeAspect="1"/>
-          </p:cNvPicPr>
-          <p:nvPr/>
-        </p:nvPicPr>
-        <p:blipFill>
-          <a:blip r:embed="rId2"/>
-          <a:stretch>
-            <a:fillRect/>
-          </a:stretch>
-        </p:blipFill>
-        <p:spPr>
-          <a:xfrm>
-            <a:off x="2951657" y="717621"/>
-            <a:ext cx="6288681" cy="5954111"/>
-          </a:xfrm>
-          <a:prstGeom prst="rect">
-            <a:avLst/>
-          </a:prstGeom>
-        </p:spPr>
-      </p:pic>
       <p:sp>
         <p:nvSpPr>
           <p:cNvPr id="3" name="Номер слайда 2">
@@ -5007,6 +5005,36 @@
           </a:p>
         </p:txBody>
       </p:sp>
+      <p:pic>
+        <p:nvPicPr>
+          <p:cNvPr id="8" name="Рисунок 7">
+            <a:extLst>
+              <a:ext uri="{FF2B5EF4-FFF2-40B4-BE49-F238E27FC236}">
+                <a16:creationId xmlns:a16="http://schemas.microsoft.com/office/drawing/2014/main" id="{96EBC8EF-3187-3B46-9133-255958CB0F75}"/>
+              </a:ext>
+            </a:extLst>
+          </p:cNvPr>
+          <p:cNvPicPr>
+            <a:picLocks noChangeAspect="1"/>
+          </p:cNvPicPr>
+          <p:nvPr/>
+        </p:nvPicPr>
+        <p:blipFill>
+          <a:blip r:embed="rId2"/>
+          <a:stretch>
+            <a:fillRect/>
+          </a:stretch>
+        </p:blipFill>
+        <p:spPr>
+          <a:xfrm>
+            <a:off x="277585" y="995972"/>
+            <a:ext cx="11636829" cy="5360378"/>
+          </a:xfrm>
+          <a:prstGeom prst="rect">
+            <a:avLst/>
+          </a:prstGeom>
+        </p:spPr>
+      </p:pic>
     </p:spTree>
     <p:extLst>
       <p:ext uri="{BB962C8B-B14F-4D97-AF65-F5344CB8AC3E}">
@@ -5255,8 +5283,8 @@
         </p:blipFill>
         <p:spPr>
           <a:xfrm>
-            <a:off x="698500" y="1235260"/>
-            <a:ext cx="10795000" cy="4387480"/>
+            <a:off x="108857" y="1053058"/>
+            <a:ext cx="11691581" cy="4751883"/>
           </a:xfrm>
           <a:prstGeom prst="rect">
             <a:avLst/>
@@ -5383,8 +5411,8 @@
         </p:blipFill>
         <p:spPr>
           <a:xfrm>
-            <a:off x="431800" y="1690688"/>
-            <a:ext cx="7408333" cy="4730109"/>
+            <a:off x="854528" y="637997"/>
+            <a:ext cx="10499272" cy="3640314"/>
           </a:xfrm>
           <a:prstGeom prst="rect">
             <a:avLst/>
@@ -5408,13 +5436,13 @@
               <p:nvPr>
                 <p:extLst>
                   <p:ext uri="{D42A27DB-BD31-4B8C-83A1-F6EECF244321}">
-                    <p14:modId xmlns:p14="http://schemas.microsoft.com/office/powerpoint/2010/main" val="135961763"/>
+                    <p14:modId xmlns:p14="http://schemas.microsoft.com/office/powerpoint/2010/main" val="2435298479"/>
                   </p:ext>
                 </p:extLst>
               </p:nvPr>
             </p:nvGraphicFramePr>
             <p:xfrm>
-              <a:off x="8102600" y="2709861"/>
+              <a:off x="3383643" y="4380734"/>
               <a:ext cx="3659248" cy="2030095"/>
             </p:xfrm>
             <a:graphic>
@@ -7537,13 +7565,13 @@
               <p:nvPr>
                 <p:extLst>
                   <p:ext uri="{D42A27DB-BD31-4B8C-83A1-F6EECF244321}">
-                    <p14:modId xmlns:p14="http://schemas.microsoft.com/office/powerpoint/2010/main" val="135961763"/>
+                    <p14:modId xmlns:p14="http://schemas.microsoft.com/office/powerpoint/2010/main" val="2435298479"/>
                   </p:ext>
                 </p:extLst>
               </p:nvPr>
             </p:nvGraphicFramePr>
             <p:xfrm>
-              <a:off x="8102600" y="2709861"/>
+              <a:off x="3383643" y="4380734"/>
               <a:ext cx="3659248" cy="2030095"/>
             </p:xfrm>
             <a:graphic>
@@ -7781,7 +7809,7 @@
                         <a:blipFill>
                           <a:blip r:embed="rId3"/>
                           <a:stretch>
-                            <a:fillRect l="-781" t="-112500" r="-125000" b="-843750"/>
+                            <a:fillRect t="-112500" r="-125781" b="-843750"/>
                           </a:stretch>
                         </a:blipFill>
                       </a:tcPr>
@@ -8066,7 +8094,7 @@
                         <a:blipFill>
                           <a:blip r:embed="rId3"/>
                           <a:stretch>
-                            <a:fillRect l="-258025" t="-212500" r="1235" b="-743750"/>
+                            <a:fillRect l="-256790" t="-212500" b="-743750"/>
                           </a:stretch>
                         </a:blipFill>
                       </a:tcPr>
@@ -8090,7 +8118,7 @@
                         <a:blipFill>
                           <a:blip r:embed="rId3"/>
                           <a:stretch>
-                            <a:fillRect l="-781" t="-312500" r="-125000" b="-643750"/>
+                            <a:fillRect t="-312500" r="-125781" b="-643750"/>
                           </a:stretch>
                         </a:blipFill>
                       </a:tcPr>
@@ -8221,7 +8249,7 @@
                         <a:blipFill>
                           <a:blip r:embed="rId3"/>
                           <a:stretch>
-                            <a:fillRect l="-258025" t="-312500" r="1235" b="-643750"/>
+                            <a:fillRect l="-256790" t="-312500" b="-643750"/>
                           </a:stretch>
                         </a:blipFill>
                       </a:tcPr>
@@ -8548,7 +8576,7 @@
                         <a:blipFill>
                           <a:blip r:embed="rId3"/>
                           <a:stretch>
-                            <a:fillRect l="-258025" t="-482353" r="1235" b="-411765"/>
+                            <a:fillRect l="-256790" t="-482353" b="-411765"/>
                           </a:stretch>
                         </a:blipFill>
                       </a:tcPr>
@@ -8572,7 +8600,7 @@
                         <a:blipFill>
                           <a:blip r:embed="rId3"/>
                           <a:stretch>
-                            <a:fillRect l="-781" t="-618750" r="-125000" b="-337500"/>
+                            <a:fillRect t="-618750" r="-125781" b="-337500"/>
                           </a:stretch>
                         </a:blipFill>
                       </a:tcPr>
@@ -8857,7 +8885,7 @@
                         <a:blipFill>
                           <a:blip r:embed="rId3"/>
                           <a:stretch>
-                            <a:fillRect l="-258025" t="-718750" r="1235" b="-237500"/>
+                            <a:fillRect l="-256790" t="-718750" b="-237500"/>
                           </a:stretch>
                         </a:blipFill>
                       </a:tcPr>
@@ -8881,7 +8909,7 @@
                         <a:blipFill>
                           <a:blip r:embed="rId3"/>
                           <a:stretch>
-                            <a:fillRect l="-781" t="-818750" r="-125000" b="-137500"/>
+                            <a:fillRect t="-818750" r="-125781" b="-137500"/>
                           </a:stretch>
                         </a:blipFill>
                       </a:tcPr>
@@ -9012,7 +9040,7 @@
                         <a:blipFill>
                           <a:blip r:embed="rId3"/>
                           <a:stretch>
-                            <a:fillRect l="-258025" t="-818750" r="1235" b="-137500"/>
+                            <a:fillRect l="-256790" t="-818750" b="-137500"/>
                           </a:stretch>
                         </a:blipFill>
                       </a:tcPr>
@@ -9208,145 +9236,132 @@
       </mc:AlternateContent>
       <p:sp>
         <p:nvSpPr>
-          <p:cNvPr id="7" name="Открывающая квадратная скобка 6">
-            <a:extLst>
-              <a:ext uri="{FF2B5EF4-FFF2-40B4-BE49-F238E27FC236}">
-                <a16:creationId xmlns:a16="http://schemas.microsoft.com/office/drawing/2014/main" id="{53D1AA7C-3DF5-DD40-A8C8-F98620F22642}"/>
-              </a:ext>
-            </a:extLst>
-          </p:cNvPr>
-          <p:cNvSpPr/>
+          <p:cNvPr id="4" name="TextBox 3">
+            <a:extLst>
+              <a:ext uri="{FF2B5EF4-FFF2-40B4-BE49-F238E27FC236}">
+                <a16:creationId xmlns:a16="http://schemas.microsoft.com/office/drawing/2014/main" id="{EA0D118E-332F-F448-A06E-D9AB6AD689E6}"/>
+              </a:ext>
+            </a:extLst>
+          </p:cNvPr>
+          <p:cNvSpPr txBox="1"/>
           <p:nvPr/>
         </p:nvSpPr>
         <p:spPr>
           <a:xfrm>
-            <a:off x="9903901" y="2813049"/>
-            <a:ext cx="44450" cy="401637"/>
+            <a:off x="854528" y="4380734"/>
+            <a:ext cx="1064715" cy="646331"/>
           </a:xfrm>
-          <a:prstGeom prst="leftBracket">
+          <a:prstGeom prst="rect">
+            <a:avLst/>
+          </a:prstGeom>
+          <a:noFill/>
+        </p:spPr>
+        <p:txBody>
+          <a:bodyPr wrap="none" rtlCol="0">
+            <a:spAutoFit/>
+          </a:bodyPr>
+          <a:lstStyle/>
+          <a:p>
+            <a:r>
+              <a:rPr lang="en-US" dirty="0"/>
+              <a:t>A = 1.010</a:t>
+            </a:r>
+          </a:p>
+          <a:p>
+            <a:r>
+              <a:rPr lang="en-US" dirty="0"/>
+              <a:t>B = 0.110</a:t>
+            </a:r>
+            <a:endParaRPr lang="ru-RU" dirty="0"/>
+          </a:p>
+        </p:txBody>
+      </p:sp>
+      <p:pic>
+        <p:nvPicPr>
+          <p:cNvPr id="39" name="Рисунок 38">
+            <a:extLst>
+              <a:ext uri="{FF2B5EF4-FFF2-40B4-BE49-F238E27FC236}">
+                <a16:creationId xmlns:a16="http://schemas.microsoft.com/office/drawing/2014/main" id="{5AA84D4B-1AF6-5A48-AAC9-6528F26E78C8}"/>
+              </a:ext>
+            </a:extLst>
+          </p:cNvPr>
+          <p:cNvPicPr>
+            <a:picLocks noChangeAspect="1"/>
+          </p:cNvPicPr>
+          <p:nvPr/>
+        </p:nvPicPr>
+        <p:blipFill>
+          <a:blip r:embed="rId4"/>
+          <a:stretch>
+            <a:fillRect/>
+          </a:stretch>
+        </p:blipFill>
+        <p:spPr>
+          <a:xfrm>
+            <a:off x="7042891" y="4120512"/>
+            <a:ext cx="3839598" cy="2235837"/>
+          </a:xfrm>
+          <a:prstGeom prst="rect">
             <a:avLst/>
           </a:prstGeom>
         </p:spPr>
-        <p:style>
-          <a:lnRef idx="1">
-            <a:schemeClr val="accent1"/>
-          </a:lnRef>
-          <a:fillRef idx="0">
-            <a:schemeClr val="accent1"/>
-          </a:fillRef>
-          <a:effectRef idx="0">
-            <a:schemeClr val="accent1"/>
-          </a:effectRef>
-          <a:fontRef idx="minor">
-            <a:schemeClr val="tx1"/>
-          </a:fontRef>
-        </p:style>
-        <p:txBody>
-          <a:bodyPr rot="0" spcFirstLastPara="0" vert="horz" wrap="square" lIns="91440" tIns="45720" rIns="91440" bIns="45720" numCol="1" spcCol="0" rtlCol="0" fromWordArt="0" anchor="ctr" anchorCtr="0" forceAA="0" compatLnSpc="1">
-            <a:prstTxWarp prst="textNoShape">
-              <a:avLst/>
-            </a:prstTxWarp>
-            <a:noAutofit/>
-          </a:bodyPr>
-          <a:lstStyle/>
-          <a:p>
-            <a:endParaRPr lang="ru-RU"/>
-          </a:p>
-        </p:txBody>
-      </p:sp>
+      </p:pic>
       <p:sp>
         <p:nvSpPr>
-          <p:cNvPr id="8" name="Открывающая квадратная скобка 7">
-            <a:extLst>
-              <a:ext uri="{FF2B5EF4-FFF2-40B4-BE49-F238E27FC236}">
-                <a16:creationId xmlns:a16="http://schemas.microsoft.com/office/drawing/2014/main" id="{64C9AC2C-ECE1-F14B-9819-616D6A82E838}"/>
-              </a:ext>
-            </a:extLst>
-          </p:cNvPr>
-          <p:cNvSpPr/>
+          <p:cNvPr id="7" name="TextBox 6">
+            <a:extLst>
+              <a:ext uri="{FF2B5EF4-FFF2-40B4-BE49-F238E27FC236}">
+                <a16:creationId xmlns:a16="http://schemas.microsoft.com/office/drawing/2014/main" id="{701893B5-EA7A-FB4A-9E3D-B12C46974E27}"/>
+              </a:ext>
+            </a:extLst>
+          </p:cNvPr>
+          <p:cNvSpPr txBox="1"/>
           <p:nvPr/>
         </p:nvSpPr>
         <p:spPr>
           <a:xfrm>
-            <a:off x="9911838" y="3651249"/>
-            <a:ext cx="60325" cy="212725"/>
+            <a:off x="747768" y="5395781"/>
+            <a:ext cx="2544414" cy="646331"/>
           </a:xfrm>
-          <a:prstGeom prst="leftBracket">
+          <a:prstGeom prst="rect">
             <a:avLst/>
           </a:prstGeom>
+          <a:noFill/>
         </p:spPr>
-        <p:style>
-          <a:lnRef idx="1">
-            <a:schemeClr val="accent1"/>
-          </a:lnRef>
-          <a:fillRef idx="0">
-            <a:schemeClr val="accent1"/>
-          </a:fillRef>
-          <a:effectRef idx="0">
-            <a:schemeClr val="accent1"/>
-          </a:effectRef>
-          <a:fontRef idx="minor">
-            <a:schemeClr val="tx1"/>
-          </a:fontRef>
-        </p:style>
         <p:txBody>
-          <a:bodyPr rot="0" spcFirstLastPara="0" vert="horz" wrap="square" lIns="91440" tIns="45720" rIns="91440" bIns="45720" numCol="1" spcCol="0" rtlCol="0" fromWordArt="0" anchor="ctr" anchorCtr="0" forceAA="0" compatLnSpc="1">
-            <a:prstTxWarp prst="textNoShape">
-              <a:avLst/>
-            </a:prstTxWarp>
-            <a:noAutofit/>
+          <a:bodyPr wrap="none" rtlCol="0">
+            <a:spAutoFit/>
           </a:bodyPr>
           <a:lstStyle/>
           <a:p>
-            <a:endParaRPr lang="ru-RU"/>
-          </a:p>
-        </p:txBody>
-      </p:sp>
-      <p:sp>
-        <p:nvSpPr>
-          <p:cNvPr id="9" name="Открывающая квадратная скобка 8">
-            <a:extLst>
-              <a:ext uri="{FF2B5EF4-FFF2-40B4-BE49-F238E27FC236}">
-                <a16:creationId xmlns:a16="http://schemas.microsoft.com/office/drawing/2014/main" id="{5EB2AE6F-8A59-1A45-A6EA-E5777C36BFA2}"/>
-              </a:ext>
-            </a:extLst>
-          </p:cNvPr>
-          <p:cNvSpPr/>
-          <p:nvPr/>
-        </p:nvSpPr>
-        <p:spPr>
-          <a:xfrm>
-            <a:off x="9919776" y="3919536"/>
-            <a:ext cx="49212" cy="358775"/>
-          </a:xfrm>
-          <a:prstGeom prst="leftBracket">
-            <a:avLst/>
-          </a:prstGeom>
-        </p:spPr>
-        <p:style>
-          <a:lnRef idx="1">
-            <a:schemeClr val="accent1"/>
-          </a:lnRef>
-          <a:fillRef idx="0">
-            <a:schemeClr val="accent1"/>
-          </a:fillRef>
-          <a:effectRef idx="0">
-            <a:schemeClr val="accent1"/>
-          </a:effectRef>
-          <a:fontRef idx="minor">
-            <a:schemeClr val="tx1"/>
-          </a:fontRef>
-        </p:style>
-        <p:txBody>
-          <a:bodyPr rot="0" spcFirstLastPara="0" vert="horz" wrap="square" lIns="91440" tIns="45720" rIns="91440" bIns="45720" numCol="1" spcCol="0" rtlCol="0" fromWordArt="0" anchor="ctr" anchorCtr="0" forceAA="0" compatLnSpc="1">
-            <a:prstTxWarp prst="textNoShape">
-              <a:avLst/>
-            </a:prstTxWarp>
-            <a:noAutofit/>
-          </a:bodyPr>
-          <a:lstStyle/>
-          <a:p>
-            <a:endParaRPr lang="ru-RU"/>
+            <a:r>
+              <a:rPr lang="en-US" dirty="0"/>
+              <a:t>Min – 5 </a:t>
+            </a:r>
+            <a:r>
+              <a:rPr lang="ru-RU" dirty="0"/>
+              <a:t>тактов при </a:t>
+            </a:r>
+            <a:r>
+              <a:rPr lang="en-US" dirty="0"/>
+              <a:t>B = 0</a:t>
+            </a:r>
+            <a:br>
+              <a:rPr lang="en-US" dirty="0"/>
+            </a:br>
+            <a:r>
+              <a:rPr lang="en-US" dirty="0"/>
+              <a:t>Max – 8 </a:t>
+            </a:r>
+            <a:r>
+              <a:rPr lang="ru-RU" dirty="0"/>
+              <a:t>тактов при </a:t>
+            </a:r>
+            <a:r>
+              <a:rPr lang="en-US" dirty="0"/>
+              <a:t>B = 5</a:t>
+            </a:r>
+            <a:endParaRPr lang="ru-RU" dirty="0"/>
           </a:p>
         </p:txBody>
       </p:sp>
@@ -9470,8 +9485,8 @@
         </p:blipFill>
         <p:spPr>
           <a:xfrm>
-            <a:off x="461725" y="1066800"/>
-            <a:ext cx="3428103" cy="5003800"/>
+            <a:off x="398063" y="633052"/>
+            <a:ext cx="3725264" cy="5437548"/>
           </a:xfrm>
           <a:prstGeom prst="rect">
             <a:avLst/>
@@ -9500,8 +9515,8 @@
         </p:blipFill>
         <p:spPr>
           <a:xfrm>
-            <a:off x="4378337" y="744009"/>
-            <a:ext cx="3614196" cy="5707591"/>
+            <a:off x="4525955" y="633052"/>
+            <a:ext cx="3133175" cy="5881375"/>
           </a:xfrm>
           <a:prstGeom prst="rect">
             <a:avLst/>
@@ -9530,8 +9545,8 @@
         </p:blipFill>
         <p:spPr>
           <a:xfrm>
-            <a:off x="8481042" y="989573"/>
-            <a:ext cx="3275386" cy="2827785"/>
+            <a:off x="8359633" y="185321"/>
+            <a:ext cx="3396795" cy="3381929"/>
           </a:xfrm>
           <a:prstGeom prst="rect">
             <a:avLst/>
@@ -9560,8 +9575,8 @@
         </p:blipFill>
         <p:spPr>
           <a:xfrm>
-            <a:off x="8481552" y="4483100"/>
-            <a:ext cx="3274876" cy="1587500"/>
+            <a:off x="8359634" y="4168050"/>
+            <a:ext cx="3396794" cy="1587500"/>
           </a:xfrm>
           <a:prstGeom prst="rect">
             <a:avLst/>
@@ -9582,7 +9597,7 @@
         </p:nvSpPr>
         <p:spPr>
           <a:xfrm>
-            <a:off x="8548435" y="3891854"/>
+            <a:off x="8565266" y="3641746"/>
             <a:ext cx="3140090" cy="369332"/>
           </a:xfrm>
           <a:prstGeom prst="rect">
@@ -9617,7 +9632,7 @@
         </p:nvSpPr>
         <p:spPr>
           <a:xfrm>
-            <a:off x="8565266" y="6145096"/>
+            <a:off x="8565266" y="5830046"/>
             <a:ext cx="3106428" cy="369332"/>
           </a:xfrm>
           <a:prstGeom prst="rect">
@@ -9687,7 +9702,7 @@
         </p:nvSpPr>
         <p:spPr>
           <a:xfrm>
-            <a:off x="959289" y="6115876"/>
+            <a:off x="1226418" y="6082401"/>
             <a:ext cx="2432974" cy="646331"/>
           </a:xfrm>
           <a:prstGeom prst="rect">

</xml_diff>